<commit_message>
small fixes post f4l
</commit_message>
<xml_diff>
--- a/instructors/03_Being_FAIR_Episode_v2.0.pptx
+++ b/instructors/03_Being_FAIR_Episode_v2.0.pptx
@@ -13,7 +13,7 @@
     <p:sldId id="260" r:id="rId7"/>
     <p:sldId id="261" r:id="rId8"/>
     <p:sldId id="265" r:id="rId9"/>
-    <p:sldId id="268" r:id="rId10"/>
+    <p:sldId id="280" r:id="rId10"/>
     <p:sldId id="269" r:id="rId11"/>
     <p:sldId id="270" r:id="rId12"/>
     <p:sldId id="272" r:id="rId13"/>
@@ -296,7 +296,7 @@
             <a:fld id="{DE72BEAC-A25F-4480-8AFC-1D3E290F2CC8}" type="datetimeFigureOut">
               <a:rPr lang="en-GB" smtClean="0"/>
               <a:pPr/>
-              <a:t>19/10/2021</a:t>
+              <a:t>16/12/2022</a:t>
             </a:fld>
             <a:endParaRPr lang="en-GB"/>
           </a:p>
@@ -560,7 +560,7 @@
           <a:p>
             <a:fld id="{DE72BEAC-A25F-4480-8AFC-1D3E290F2CC8}" type="datetimeFigureOut">
               <a:rPr lang="en-GB" smtClean="0"/>
-              <a:t>19/10/2021</a:t>
+              <a:t>16/12/2022</a:t>
             </a:fld>
             <a:endParaRPr lang="en-GB"/>
           </a:p>
@@ -770,7 +770,7 @@
           <a:p>
             <a:fld id="{DE72BEAC-A25F-4480-8AFC-1D3E290F2CC8}" type="datetimeFigureOut">
               <a:rPr lang="en-GB" smtClean="0"/>
-              <a:t>19/10/2021</a:t>
+              <a:t>16/12/2022</a:t>
             </a:fld>
             <a:endParaRPr lang="en-GB"/>
           </a:p>
@@ -970,7 +970,7 @@
           <a:p>
             <a:fld id="{DE72BEAC-A25F-4480-8AFC-1D3E290F2CC8}" type="datetimeFigureOut">
               <a:rPr lang="en-GB" smtClean="0"/>
-              <a:t>19/10/2021</a:t>
+              <a:t>16/12/2022</a:t>
             </a:fld>
             <a:endParaRPr lang="en-GB"/>
           </a:p>
@@ -1246,7 +1246,7 @@
           <a:p>
             <a:fld id="{DE72BEAC-A25F-4480-8AFC-1D3E290F2CC8}" type="datetimeFigureOut">
               <a:rPr lang="en-GB" smtClean="0"/>
-              <a:t>19/10/2021</a:t>
+              <a:t>16/12/2022</a:t>
             </a:fld>
             <a:endParaRPr lang="en-GB"/>
           </a:p>
@@ -1514,7 +1514,7 @@
           <a:p>
             <a:fld id="{DE72BEAC-A25F-4480-8AFC-1D3E290F2CC8}" type="datetimeFigureOut">
               <a:rPr lang="en-GB" smtClean="0"/>
-              <a:t>19/10/2021</a:t>
+              <a:t>16/12/2022</a:t>
             </a:fld>
             <a:endParaRPr lang="en-GB"/>
           </a:p>
@@ -1929,7 +1929,7 @@
           <a:p>
             <a:fld id="{DE72BEAC-A25F-4480-8AFC-1D3E290F2CC8}" type="datetimeFigureOut">
               <a:rPr lang="en-GB" smtClean="0"/>
-              <a:t>19/10/2021</a:t>
+              <a:t>16/12/2022</a:t>
             </a:fld>
             <a:endParaRPr lang="en-GB"/>
           </a:p>
@@ -2071,7 +2071,7 @@
           <a:p>
             <a:fld id="{DE72BEAC-A25F-4480-8AFC-1D3E290F2CC8}" type="datetimeFigureOut">
               <a:rPr lang="en-GB" smtClean="0"/>
-              <a:t>19/10/2021</a:t>
+              <a:t>16/12/2022</a:t>
             </a:fld>
             <a:endParaRPr lang="en-GB"/>
           </a:p>
@@ -2184,7 +2184,7 @@
           <a:p>
             <a:fld id="{DE72BEAC-A25F-4480-8AFC-1D3E290F2CC8}" type="datetimeFigureOut">
               <a:rPr lang="en-GB" smtClean="0"/>
-              <a:t>19/10/2021</a:t>
+              <a:t>16/12/2022</a:t>
             </a:fld>
             <a:endParaRPr lang="en-GB"/>
           </a:p>
@@ -2497,7 +2497,7 @@
           <a:p>
             <a:fld id="{DE72BEAC-A25F-4480-8AFC-1D3E290F2CC8}" type="datetimeFigureOut">
               <a:rPr lang="en-GB" smtClean="0"/>
-              <a:t>19/10/2021</a:t>
+              <a:t>16/12/2022</a:t>
             </a:fld>
             <a:endParaRPr lang="en-GB"/>
           </a:p>
@@ -2786,7 +2786,7 @@
           <a:p>
             <a:fld id="{DE72BEAC-A25F-4480-8AFC-1D3E290F2CC8}" type="datetimeFigureOut">
               <a:rPr lang="en-GB" smtClean="0"/>
-              <a:t>19/10/2021</a:t>
+              <a:t>16/12/2022</a:t>
             </a:fld>
             <a:endParaRPr lang="en-GB"/>
           </a:p>
@@ -3028,7 +3028,7 @@
             <a:fld id="{DE72BEAC-A25F-4480-8AFC-1D3E290F2CC8}" type="datetimeFigureOut">
               <a:rPr lang="en-GB" smtClean="0"/>
               <a:pPr/>
-              <a:t>19/10/2021</a:t>
+              <a:t>16/12/2022</a:t>
             </a:fld>
             <a:endParaRPr lang="en-GB"/>
           </a:p>
@@ -3756,7 +3756,7 @@
                 <a:hlinkClick r:id="rId2">
                   <a:extLst>
                     <a:ext uri="{A12FA001-AC4F-418D-AE19-62706E023703}">
-                      <ahyp:hlinkClr xmlns:ahyp="http://schemas.microsoft.com/office/drawing/2018/hyperlinkcolor" val="tx"/>
+                      <ahyp:hlinkClr xmlns:ahyp="http://schemas.microsoft.com/office/drawing/2018/hyperlinkcolor" xmlns="" val="tx"/>
                     </a:ext>
                   </a:extLst>
                 </a:hlinkClick>
@@ -3779,7 +3779,7 @@
                 <a:hlinkClick r:id="rId3">
                   <a:extLst>
                     <a:ext uri="{A12FA001-AC4F-418D-AE19-62706E023703}">
-                      <ahyp:hlinkClr xmlns:ahyp="http://schemas.microsoft.com/office/drawing/2018/hyperlinkcolor" val="tx"/>
+                      <ahyp:hlinkClr xmlns:ahyp="http://schemas.microsoft.com/office/drawing/2018/hyperlinkcolor" xmlns="" val="tx"/>
                     </a:ext>
                   </a:extLst>
                 </a:hlinkClick>
@@ -3802,7 +3802,7 @@
                 <a:hlinkClick r:id="rId4">
                   <a:extLst>
                     <a:ext uri="{A12FA001-AC4F-418D-AE19-62706E023703}">
-                      <ahyp:hlinkClr xmlns:ahyp="http://schemas.microsoft.com/office/drawing/2018/hyperlinkcolor" val="tx"/>
+                      <ahyp:hlinkClr xmlns:ahyp="http://schemas.microsoft.com/office/drawing/2018/hyperlinkcolor" xmlns="" val="tx"/>
                     </a:ext>
                   </a:extLst>
                 </a:hlinkClick>
@@ -3825,7 +3825,7 @@
                 <a:hlinkClick r:id="rId5">
                   <a:extLst>
                     <a:ext uri="{A12FA001-AC4F-418D-AE19-62706E023703}">
-                      <ahyp:hlinkClr xmlns:ahyp="http://schemas.microsoft.com/office/drawing/2018/hyperlinkcolor" val="tx"/>
+                      <ahyp:hlinkClr xmlns:ahyp="http://schemas.microsoft.com/office/drawing/2018/hyperlinkcolor" xmlns="" val="tx"/>
                     </a:ext>
                   </a:extLst>
                 </a:hlinkClick>
@@ -3867,7 +3867,7 @@
                 <a:hlinkClick r:id="rId6">
                   <a:extLst>
                     <a:ext uri="{A12FA001-AC4F-418D-AE19-62706E023703}">
-                      <ahyp:hlinkClr xmlns:ahyp="http://schemas.microsoft.com/office/drawing/2018/hyperlinkcolor" val="tx"/>
+                      <ahyp:hlinkClr xmlns:ahyp="http://schemas.microsoft.com/office/drawing/2018/hyperlinkcolor" xmlns="" val="tx"/>
                     </a:ext>
                   </a:extLst>
                 </a:hlinkClick>
@@ -3890,7 +3890,7 @@
                 <a:hlinkClick r:id="rId7">
                   <a:extLst>
                     <a:ext uri="{A12FA001-AC4F-418D-AE19-62706E023703}">
-                      <ahyp:hlinkClr xmlns:ahyp="http://schemas.microsoft.com/office/drawing/2018/hyperlinkcolor" val="tx"/>
+                      <ahyp:hlinkClr xmlns:ahyp="http://schemas.microsoft.com/office/drawing/2018/hyperlinkcolor" xmlns="" val="tx"/>
                     </a:ext>
                   </a:extLst>
                 </a:hlinkClick>
@@ -3913,7 +3913,7 @@
                 <a:hlinkClick r:id="rId8">
                   <a:extLst>
                     <a:ext uri="{A12FA001-AC4F-418D-AE19-62706E023703}">
-                      <ahyp:hlinkClr xmlns:ahyp="http://schemas.microsoft.com/office/drawing/2018/hyperlinkcolor" val="tx"/>
+                      <ahyp:hlinkClr xmlns:ahyp="http://schemas.microsoft.com/office/drawing/2018/hyperlinkcolor" xmlns="" val="tx"/>
                     </a:ext>
                   </a:extLst>
                 </a:hlinkClick>
@@ -4600,7 +4600,7 @@
                 <a14:useLocalDpi xmlns:a14="http://schemas.microsoft.com/office/drawing/2010/main" val="0"/>
               </a:ext>
               <a:ext uri="{96DAC541-7B7A-43D3-8B79-37D633B846F1}">
-                <asvg:svgBlip xmlns:asvg="http://schemas.microsoft.com/office/drawing/2016/SVG/main" r:embed="rId3"/>
+                <asvg:svgBlip xmlns:asvg="http://schemas.microsoft.com/office/drawing/2016/SVG/main" xmlns="" r:embed="rId3"/>
               </a:ext>
             </a:extLst>
           </a:blip>
@@ -4812,7 +4812,7 @@
                 <a14:useLocalDpi xmlns:a14="http://schemas.microsoft.com/office/drawing/2010/main" val="0"/>
               </a:ext>
               <a:ext uri="{96DAC541-7B7A-43D3-8B79-37D633B846F1}">
-                <asvg:svgBlip xmlns:asvg="http://schemas.microsoft.com/office/drawing/2016/SVG/main" r:embed="rId7"/>
+                <asvg:svgBlip xmlns:asvg="http://schemas.microsoft.com/office/drawing/2016/SVG/main" xmlns="" r:embed="rId7"/>
               </a:ext>
             </a:extLst>
           </a:blip>
@@ -5451,7 +5451,7 @@
                 <a16:creationId xmlns:a16="http://schemas.microsoft.com/office/drawing/2014/main" id="{91F32EBA-ED97-466E-8CFA-8382584155D0}"/>
               </a:ext>
               <a:ext uri="{C183D7F6-B498-43B3-948B-1728B52AA6E4}">
-                <adec:decorative xmlns:adec="http://schemas.microsoft.com/office/drawing/2017/decorative" val="1"/>
+                <adec:decorative xmlns:adec="http://schemas.microsoft.com/office/drawing/2017/decorative" xmlns="" val="1"/>
               </a:ext>
             </a:extLst>
           </p:cNvPr>
@@ -5584,7 +5584,7 @@
                 <a16:creationId xmlns:a16="http://schemas.microsoft.com/office/drawing/2014/main" id="{62A38935-BB53-4DF7-A56E-48DD25B685D7}"/>
               </a:ext>
               <a:ext uri="{C183D7F6-B498-43B3-948B-1728B52AA6E4}">
-                <adec:decorative xmlns:adec="http://schemas.microsoft.com/office/drawing/2017/decorative" val="1"/>
+                <adec:decorative xmlns:adec="http://schemas.microsoft.com/office/drawing/2017/decorative" xmlns="" val="1"/>
               </a:ext>
             </a:extLst>
           </p:cNvPr>
@@ -6371,7 +6371,7 @@
                 <a14:useLocalDpi xmlns:a14="http://schemas.microsoft.com/office/drawing/2010/main" val="0"/>
               </a:ext>
               <a:ext uri="{96DAC541-7B7A-43D3-8B79-37D633B846F1}">
-                <asvg:svgBlip xmlns:asvg="http://schemas.microsoft.com/office/drawing/2016/SVG/main" r:embed="rId3"/>
+                <asvg:svgBlip xmlns:asvg="http://schemas.microsoft.com/office/drawing/2016/SVG/main" xmlns="" r:embed="rId3"/>
               </a:ext>
             </a:extLst>
           </a:blip>
@@ -6437,7 +6437,7 @@
                 <a16:creationId xmlns:a16="http://schemas.microsoft.com/office/drawing/2014/main" id="{C4E4288A-DFC8-40A2-90E5-70E851A933AD}"/>
               </a:ext>
               <a:ext uri="{C183D7F6-B498-43B3-948B-1728B52AA6E4}">
-                <adec:decorative xmlns:adec="http://schemas.microsoft.com/office/drawing/2017/decorative" val="1"/>
+                <adec:decorative xmlns:adec="http://schemas.microsoft.com/office/drawing/2017/decorative" xmlns="" val="1"/>
               </a:ext>
             </a:extLst>
           </p:cNvPr>
@@ -6532,7 +6532,7 @@
                 <a16:creationId xmlns:a16="http://schemas.microsoft.com/office/drawing/2014/main" id="{A94A2FC9-6D19-473C-B868-99FDB2044AA9}"/>
               </a:ext>
               <a:ext uri="{C183D7F6-B498-43B3-948B-1728B52AA6E4}">
-                <adec:decorative xmlns:adec="http://schemas.microsoft.com/office/drawing/2017/decorative" val="1"/>
+                <adec:decorative xmlns:adec="http://schemas.microsoft.com/office/drawing/2017/decorative" xmlns="" val="1"/>
               </a:ext>
             </a:extLst>
           </p:cNvPr>
@@ -6745,13 +6745,13 @@
           <p:nvPr/>
         </p:nvPicPr>
         <p:blipFill>
-          <a:blip r:embed="rId2">
+          <a:blip r:embed="rId2" cstate="hqprint">
             <a:extLst>
               <a:ext uri="{28A0092B-C50C-407E-A947-70E740481C1C}">
                 <a14:useLocalDpi xmlns:a14="http://schemas.microsoft.com/office/drawing/2010/main" val="0"/>
               </a:ext>
               <a:ext uri="{96DAC541-7B7A-43D3-8B79-37D633B846F1}">
-                <asvg:svgBlip xmlns:asvg="http://schemas.microsoft.com/office/drawing/2016/SVG/main" r:embed="rId3"/>
+                <asvg:svgBlip xmlns:asvg="http://schemas.microsoft.com/office/drawing/2016/SVG/main" xmlns="" r:embed="rId3"/>
               </a:ext>
             </a:extLst>
           </a:blip>
@@ -6887,7 +6887,7 @@
                 <a16:creationId xmlns:a16="http://schemas.microsoft.com/office/drawing/2014/main" id="{8BED0409-854E-49C4-876E-A78C6D881BC8}"/>
               </a:ext>
               <a:ext uri="{C183D7F6-B498-43B3-948B-1728B52AA6E4}">
-                <adec:decorative xmlns:adec="http://schemas.microsoft.com/office/drawing/2017/decorative" val="1"/>
+                <adec:decorative xmlns:adec="http://schemas.microsoft.com/office/drawing/2017/decorative" xmlns="" val="1"/>
               </a:ext>
             </a:extLst>
           </p:cNvPr>
@@ -7532,7 +7532,7 @@
                 <a16:creationId xmlns:a16="http://schemas.microsoft.com/office/drawing/2014/main" id="{D4340B2E-01FD-4F5D-9C4D-AD3923AD20BA}"/>
               </a:ext>
               <a:ext uri="{C183D7F6-B498-43B3-948B-1728B52AA6E4}">
-                <adec:decorative xmlns:adec="http://schemas.microsoft.com/office/drawing/2017/decorative" val="1"/>
+                <adec:decorative xmlns:adec="http://schemas.microsoft.com/office/drawing/2017/decorative" xmlns="" val="1"/>
               </a:ext>
             </a:extLst>
           </p:cNvPr>
@@ -7751,7 +7751,7 @@
                 <a14:useLocalDpi xmlns:a14="http://schemas.microsoft.com/office/drawing/2010/main" val="0"/>
               </a:ext>
               <a:ext uri="{96DAC541-7B7A-43D3-8B79-37D633B846F1}">
-                <asvg:svgBlip xmlns:asvg="http://schemas.microsoft.com/office/drawing/2016/SVG/main" r:embed="rId5"/>
+                <asvg:svgBlip xmlns:asvg="http://schemas.microsoft.com/office/drawing/2016/SVG/main" xmlns="" r:embed="rId5"/>
               </a:ext>
             </a:extLst>
           </a:blip>
@@ -7790,7 +7790,7 @@
                 <a14:useLocalDpi xmlns:a14="http://schemas.microsoft.com/office/drawing/2010/main" val="0"/>
               </a:ext>
               <a:ext uri="{96DAC541-7B7A-43D3-8B79-37D633B846F1}">
-                <asvg:svgBlip xmlns:asvg="http://schemas.microsoft.com/office/drawing/2016/SVG/main" r:embed="rId7"/>
+                <asvg:svgBlip xmlns:asvg="http://schemas.microsoft.com/office/drawing/2016/SVG/main" xmlns="" r:embed="rId7"/>
               </a:ext>
             </a:extLst>
           </a:blip>
@@ -8675,7 +8675,11 @@
           <a:lstStyle/>
           <a:p>
             <a:r>
-              <a:rPr lang="en-GB" dirty="0"/>
+              <a:rPr lang="en-GB">
+                <a:solidFill>
+                  <a:srgbClr val="0070C0"/>
+                </a:solidFill>
+              </a:rPr>
               <a:t>FAIR principles</a:t>
             </a:r>
           </a:p>
@@ -8703,7 +8707,7 @@
           </a:prstGeom>
         </p:spPr>
         <p:txBody>
-          <a:bodyPr wrap="square">
+          <a:bodyPr wrap="square" lIns="91440" tIns="45720" rIns="91440" bIns="45720" anchor="t">
             <a:spAutoFit/>
           </a:bodyPr>
           <a:lstStyle/>
@@ -8722,7 +8726,86 @@
                   <a:srgbClr val="0070C0"/>
                 </a:solidFill>
               </a:rPr>
-              <a:t>: Easy to find the data and the metadata for both humans and computers. Automatic and reliable discovery of datasets and services depends on machine-readable persistent identifiers (PIDs) and metadata.</a:t>
+              <a:t>:  </a:t>
+            </a:r>
+            <a:endParaRPr lang="pl-PL" sz="2000" dirty="0">
+              <a:solidFill>
+                <a:srgbClr val="0070C0"/>
+              </a:solidFill>
+            </a:endParaRPr>
+          </a:p>
+          <a:p>
+            <a:pPr marL="342900" indent="-342900">
+              <a:buFont typeface="Arial" panose="020B0604020202020204" pitchFamily="34" charset="0"/>
+              <a:buChar char="•"/>
+            </a:pPr>
+            <a:r>
+              <a:rPr lang="en-GB" sz="2000" dirty="0" smtClean="0">
+                <a:solidFill>
+                  <a:srgbClr val="0070C0"/>
+                </a:solidFill>
+              </a:rPr>
+              <a:t>persistent identifiers pointing </a:t>
+            </a:r>
+            <a:r>
+              <a:rPr lang="pl-PL" sz="2000" dirty="0" smtClean="0">
+                <a:solidFill>
+                  <a:srgbClr val="0070C0"/>
+                </a:solidFill>
+              </a:rPr>
+              <a:t>to </a:t>
+            </a:r>
+            <a:r>
+              <a:rPr lang="pl-PL" sz="2000" dirty="0">
+                <a:solidFill>
+                  <a:srgbClr val="0070C0"/>
+                </a:solidFill>
+              </a:rPr>
+              <a:t>the data</a:t>
+            </a:r>
+            <a:endParaRPr lang="pl-PL" sz="2000" dirty="0">
+              <a:solidFill>
+                <a:srgbClr val="0070C0"/>
+              </a:solidFill>
+              <a:cs typeface="Calibri"/>
+            </a:endParaRPr>
+          </a:p>
+          <a:p>
+            <a:pPr marL="342900" indent="-342900">
+              <a:buFont typeface="Arial" panose="020B0604020202020204" pitchFamily="34" charset="0"/>
+              <a:buChar char="•"/>
+            </a:pPr>
+            <a:r>
+              <a:rPr lang="en-GB" sz="2000" dirty="0" smtClean="0">
+                <a:solidFill>
+                  <a:srgbClr val="0070C0"/>
+                </a:solidFill>
+              </a:rPr>
+              <a:t>descriptions that allow discovery</a:t>
+            </a:r>
+            <a:r>
+              <a:rPr lang="pl-PL" sz="2000" dirty="0" smtClean="0">
+                <a:solidFill>
+                  <a:srgbClr val="0070C0"/>
+                </a:solidFill>
+              </a:rPr>
+              <a:t> </a:t>
+            </a:r>
+            <a:r>
+              <a:rPr lang="pl-PL" sz="2000" dirty="0">
+                <a:solidFill>
+                  <a:srgbClr val="0070C0"/>
+                </a:solidFill>
+              </a:rPr>
+              <a:t>by</a:t>
+            </a:r>
+            <a:r>
+              <a:rPr lang="en-GB" sz="2000" dirty="0">
+                <a:solidFill>
+                  <a:srgbClr val="0070C0"/>
+                </a:solidFill>
+              </a:rPr>
+              <a:t> both humans and computers</a:t>
             </a:r>
           </a:p>
           <a:p>
@@ -8747,8 +8830,70 @@
                   <a:srgbClr val="0070C0"/>
                 </a:solidFill>
               </a:rPr>
-              <a:t>: The (meta)data retrievable by their identifier using a standardised and open communications protocol (including authentication and authorisation). Metadata should be available even when the data are no longer available.</a:t>
-            </a:r>
+              <a:t>: </a:t>
+            </a:r>
+            <a:endParaRPr lang="pl-PL" sz="2000" dirty="0">
+              <a:solidFill>
+                <a:srgbClr val="0070C0"/>
+              </a:solidFill>
+            </a:endParaRPr>
+          </a:p>
+          <a:p>
+            <a:pPr marL="342900" indent="-342900">
+              <a:buFont typeface="Arial" panose="020B0604020202020204" pitchFamily="34" charset="0"/>
+              <a:buChar char="•"/>
+            </a:pPr>
+            <a:r>
+              <a:rPr lang="en-GB" sz="2000" dirty="0">
+                <a:solidFill>
+                  <a:srgbClr val="0070C0"/>
+                </a:solidFill>
+              </a:rPr>
+              <a:t>(meta)data retrieval</a:t>
+            </a:r>
+            <a:r>
+              <a:rPr lang="pl-PL" sz="2000" dirty="0">
+                <a:solidFill>
+                  <a:srgbClr val="0070C0"/>
+                </a:solidFill>
+              </a:rPr>
+              <a:t> by standard protocols (http)</a:t>
+            </a:r>
+          </a:p>
+          <a:p>
+            <a:pPr marL="342900" indent="-342900">
+              <a:buFont typeface="Arial" panose="020B0604020202020204" pitchFamily="34" charset="0"/>
+              <a:buChar char="•"/>
+            </a:pPr>
+            <a:r>
+              <a:rPr lang="en-GB" sz="2000" dirty="0" smtClean="0">
+                <a:solidFill>
+                  <a:srgbClr val="0070C0"/>
+                </a:solidFill>
+              </a:rPr>
+              <a:t>metadata </a:t>
+            </a:r>
+            <a:r>
+              <a:rPr lang="en-GB" sz="2000" dirty="0">
+                <a:solidFill>
+                  <a:srgbClr val="0070C0"/>
+                </a:solidFill>
+              </a:rPr>
+              <a:t>available even when the data are no</a:t>
+            </a:r>
+            <a:r>
+              <a:rPr lang="pl-PL" sz="2000" dirty="0">
+                <a:solidFill>
+                  <a:srgbClr val="0070C0"/>
+                </a:solidFill>
+              </a:rPr>
+              <a:t>t</a:t>
+            </a:r>
+            <a:endParaRPr lang="en-GB" sz="2000" dirty="0">
+              <a:solidFill>
+                <a:srgbClr val="0070C0"/>
+              </a:solidFill>
+            </a:endParaRPr>
           </a:p>
           <a:p>
             <a:endParaRPr lang="en-GB" sz="2000" dirty="0">
@@ -8772,7 +8917,72 @@
                   <a:srgbClr val="0070C0"/>
                 </a:solidFill>
               </a:rPr>
-              <a:t>: The data should be able to be combined with and used with other data or tools. The format of the data should be open and interpretable for various tools. It applies both to the data and metadata, the (meta)data should use vocabularies that follow FAIR principles.</a:t>
+              <a:t>: </a:t>
+            </a:r>
+            <a:endParaRPr lang="pl-PL" sz="2000" dirty="0">
+              <a:solidFill>
+                <a:srgbClr val="0070C0"/>
+              </a:solidFill>
+            </a:endParaRPr>
+          </a:p>
+          <a:p>
+            <a:pPr marL="342900" indent="-342900">
+              <a:buFont typeface="Arial" panose="020B0604020202020204" pitchFamily="34" charset="0"/>
+              <a:buChar char="•"/>
+            </a:pPr>
+            <a:r>
+              <a:rPr lang="pl-PL" sz="2000" dirty="0">
+                <a:solidFill>
+                  <a:srgbClr val="0070C0"/>
+                </a:solidFill>
+              </a:rPr>
+              <a:t>(meta)data saved in open/common format (</a:t>
+            </a:r>
+            <a:r>
+              <a:rPr lang="en-GB" sz="2000" dirty="0">
+                <a:solidFill>
+                  <a:srgbClr val="0070C0"/>
+                </a:solidFill>
+              </a:rPr>
+              <a:t>interpretable for various tools</a:t>
+            </a:r>
+            <a:r>
+              <a:rPr lang="pl-PL" sz="2000" dirty="0">
+                <a:solidFill>
+                  <a:srgbClr val="0070C0"/>
+                </a:solidFill>
+              </a:rPr>
+              <a:t>)</a:t>
+            </a:r>
+          </a:p>
+          <a:p>
+            <a:pPr marL="342900" indent="-342900">
+              <a:buFont typeface="Arial" panose="020B0604020202020204" pitchFamily="34" charset="0"/>
+              <a:buChar char="•"/>
+            </a:pPr>
+            <a:r>
+              <a:rPr lang="en-GB" sz="2000" dirty="0">
+                <a:solidFill>
+                  <a:srgbClr val="0070C0"/>
+                </a:solidFill>
+              </a:rPr>
+              <a:t>(</a:t>
+            </a:r>
+            <a:r>
+              <a:rPr lang="pl-PL" sz="2000" dirty="0">
+                <a:solidFill>
+                  <a:srgbClr val="0070C0"/>
+                </a:solidFill>
+              </a:rPr>
+              <a:t>m</a:t>
+            </a:r>
+            <a:r>
+              <a:rPr lang="en-GB" sz="2000" dirty="0">
+                <a:solidFill>
+                  <a:srgbClr val="0070C0"/>
+                </a:solidFill>
+              </a:rPr>
+              <a:t>eta)data should use vocabularies that follow FAIR principles.</a:t>
             </a:r>
           </a:p>
           <a:p>
@@ -8797,7 +9007,85 @@
                   <a:srgbClr val="0070C0"/>
                 </a:solidFill>
               </a:rPr>
-              <a:t>: FAIR aims at optimising the reuse of data. Metadata and data should be well-described so that they can be replicated and/or combined in different settings. The reuse of the (meta)data should be stated with clear and accessible license(s)</a:t>
+              <a:t>: </a:t>
+            </a:r>
+            <a:endParaRPr lang="pl-PL" sz="2000" dirty="0">
+              <a:solidFill>
+                <a:srgbClr val="0070C0"/>
+              </a:solidFill>
+            </a:endParaRPr>
+          </a:p>
+          <a:p>
+            <a:pPr marL="342900" indent="-342900">
+              <a:buFont typeface="Arial" panose="020B0604020202020204" pitchFamily="34" charset="0"/>
+              <a:buChar char="•"/>
+            </a:pPr>
+            <a:r>
+              <a:rPr lang="en-GB" sz="2000" dirty="0">
+                <a:solidFill>
+                  <a:srgbClr val="0070C0"/>
+                </a:solidFill>
+              </a:rPr>
+              <a:t>data should be well-described so that they can be replicated and/or combined in different settings</a:t>
+            </a:r>
+            <a:endParaRPr lang="pl-PL" sz="2000" dirty="0">
+              <a:solidFill>
+                <a:srgbClr val="0070C0"/>
+              </a:solidFill>
+            </a:endParaRPr>
+          </a:p>
+          <a:p>
+            <a:pPr marL="342900" indent="-342900">
+              <a:buFont typeface="Arial" panose="020B0604020202020204" pitchFamily="34" charset="0"/>
+              <a:buChar char="•"/>
+            </a:pPr>
+            <a:r>
+              <a:rPr lang="pl-PL" sz="2000" dirty="0">
+                <a:solidFill>
+                  <a:srgbClr val="0070C0"/>
+                </a:solidFill>
+              </a:rPr>
+              <a:t>conditions of</a:t>
+            </a:r>
+            <a:r>
+              <a:rPr lang="en-GB" sz="2000" dirty="0">
+                <a:solidFill>
+                  <a:srgbClr val="0070C0"/>
+                </a:solidFill>
+              </a:rPr>
+              <a:t> </a:t>
+            </a:r>
+            <a:r>
+              <a:rPr lang="pl-PL" sz="2000" dirty="0">
+                <a:solidFill>
+                  <a:srgbClr val="0070C0"/>
+                </a:solidFill>
+              </a:rPr>
+              <a:t>t</a:t>
+            </a:r>
+            <a:r>
+              <a:rPr lang="en-GB" sz="2000" dirty="0">
+                <a:solidFill>
+                  <a:srgbClr val="0070C0"/>
+                </a:solidFill>
+              </a:rPr>
+              <a:t>he reuse should be stated with </a:t>
+            </a:r>
+            <a:r>
+              <a:rPr lang="pl-PL" sz="2000" dirty="0">
+                <a:solidFill>
+                  <a:srgbClr val="0070C0"/>
+                </a:solidFill>
+              </a:rPr>
+              <a:t>a </a:t>
+            </a:r>
+            <a:r>
+              <a:rPr lang="en-GB" sz="2000" dirty="0">
+                <a:solidFill>
+                  <a:srgbClr val="0070C0"/>
+                </a:solidFill>
+              </a:rPr>
+              <a:t>clear license</a:t>
             </a:r>
           </a:p>
         </p:txBody>
@@ -8805,190 +9093,13 @@
     </p:spTree>
     <p:extLst>
       <p:ext uri="{BB962C8B-B14F-4D97-AF65-F5344CB8AC3E}">
-        <p14:creationId xmlns:p14="http://schemas.microsoft.com/office/powerpoint/2010/main" val="2973248559"/>
+        <p14:creationId xmlns:p14="http://schemas.microsoft.com/office/powerpoint/2010/main" val="59580494"/>
       </p:ext>
     </p:extLst>
   </p:cSld>
   <p:clrMapOvr>
     <a:masterClrMapping/>
   </p:clrMapOvr>
-  <p:timing>
-    <p:tnLst>
-      <p:par>
-        <p:cTn id="1" dur="indefinite" restart="never" nodeType="tmRoot">
-          <p:childTnLst>
-            <p:seq concurrent="1" nextAc="seek">
-              <p:cTn id="2" dur="indefinite" nodeType="mainSeq">
-                <p:childTnLst>
-                  <p:par>
-                    <p:cTn id="3" fill="hold">
-                      <p:stCondLst>
-                        <p:cond delay="indefinite"/>
-                      </p:stCondLst>
-                      <p:childTnLst>
-                        <p:par>
-                          <p:cTn id="4" fill="hold">
-                            <p:stCondLst>
-                              <p:cond delay="0"/>
-                            </p:stCondLst>
-                            <p:childTnLst>
-                              <p:par>
-                                <p:cTn id="5" presetID="1" presetClass="entr" presetSubtype="0" fill="hold" nodeType="clickEffect">
-                                  <p:stCondLst>
-                                    <p:cond delay="0"/>
-                                  </p:stCondLst>
-                                  <p:childTnLst>
-                                    <p:set>
-                                      <p:cBhvr>
-                                        <p:cTn id="6" dur="1" fill="hold">
-                                          <p:stCondLst>
-                                            <p:cond delay="0"/>
-                                          </p:stCondLst>
-                                        </p:cTn>
-                                        <p:tgtEl>
-                                          <p:spTgt spid="9">
-                                            <p:txEl>
-                                              <p:pRg st="2" end="2"/>
-                                            </p:txEl>
-                                          </p:spTgt>
-                                        </p:tgtEl>
-                                        <p:attrNameLst>
-                                          <p:attrName>style.visibility</p:attrName>
-                                        </p:attrNameLst>
-                                      </p:cBhvr>
-                                      <p:to>
-                                        <p:strVal val="visible"/>
-                                      </p:to>
-                                    </p:set>
-                                  </p:childTnLst>
-                                </p:cTn>
-                              </p:par>
-                            </p:childTnLst>
-                          </p:cTn>
-                        </p:par>
-                      </p:childTnLst>
-                    </p:cTn>
-                  </p:par>
-                  <p:par>
-                    <p:cTn id="7" fill="hold">
-                      <p:stCondLst>
-                        <p:cond delay="indefinite"/>
-                      </p:stCondLst>
-                      <p:childTnLst>
-                        <p:par>
-                          <p:cTn id="8" fill="hold">
-                            <p:stCondLst>
-                              <p:cond delay="0"/>
-                            </p:stCondLst>
-                            <p:childTnLst>
-                              <p:par>
-                                <p:cTn id="9" presetID="1" presetClass="entr" presetSubtype="0" fill="hold" nodeType="clickEffect">
-                                  <p:stCondLst>
-                                    <p:cond delay="0"/>
-                                  </p:stCondLst>
-                                  <p:childTnLst>
-                                    <p:set>
-                                      <p:cBhvr>
-                                        <p:cTn id="10" dur="1" fill="hold">
-                                          <p:stCondLst>
-                                            <p:cond delay="0"/>
-                                          </p:stCondLst>
-                                        </p:cTn>
-                                        <p:tgtEl>
-                                          <p:spTgt spid="9">
-                                            <p:txEl>
-                                              <p:pRg st="4" end="4"/>
-                                            </p:txEl>
-                                          </p:spTgt>
-                                        </p:tgtEl>
-                                        <p:attrNameLst>
-                                          <p:attrName>style.visibility</p:attrName>
-                                        </p:attrNameLst>
-                                      </p:cBhvr>
-                                      <p:to>
-                                        <p:strVal val="visible"/>
-                                      </p:to>
-                                    </p:set>
-                                  </p:childTnLst>
-                                </p:cTn>
-                              </p:par>
-                            </p:childTnLst>
-                          </p:cTn>
-                        </p:par>
-                      </p:childTnLst>
-                    </p:cTn>
-                  </p:par>
-                  <p:par>
-                    <p:cTn id="11" fill="hold">
-                      <p:stCondLst>
-                        <p:cond delay="indefinite"/>
-                      </p:stCondLst>
-                      <p:childTnLst>
-                        <p:par>
-                          <p:cTn id="12" fill="hold">
-                            <p:stCondLst>
-                              <p:cond delay="0"/>
-                            </p:stCondLst>
-                            <p:childTnLst>
-                              <p:par>
-                                <p:cTn id="13" presetID="1" presetClass="entr" presetSubtype="0" fill="hold" nodeType="clickEffect">
-                                  <p:stCondLst>
-                                    <p:cond delay="0"/>
-                                  </p:stCondLst>
-                                  <p:childTnLst>
-                                    <p:set>
-                                      <p:cBhvr>
-                                        <p:cTn id="14" dur="1" fill="hold">
-                                          <p:stCondLst>
-                                            <p:cond delay="0"/>
-                                          </p:stCondLst>
-                                        </p:cTn>
-                                        <p:tgtEl>
-                                          <p:spTgt spid="9">
-                                            <p:txEl>
-                                              <p:pRg st="6" end="6"/>
-                                            </p:txEl>
-                                          </p:spTgt>
-                                        </p:tgtEl>
-                                        <p:attrNameLst>
-                                          <p:attrName>style.visibility</p:attrName>
-                                        </p:attrNameLst>
-                                      </p:cBhvr>
-                                      <p:to>
-                                        <p:strVal val="visible"/>
-                                      </p:to>
-                                    </p:set>
-                                  </p:childTnLst>
-                                </p:cTn>
-                              </p:par>
-                            </p:childTnLst>
-                          </p:cTn>
-                        </p:par>
-                      </p:childTnLst>
-                    </p:cTn>
-                  </p:par>
-                </p:childTnLst>
-              </p:cTn>
-              <p:prevCondLst>
-                <p:cond evt="onPrev" delay="0">
-                  <p:tgtEl>
-                    <p:sldTgt/>
-                  </p:tgtEl>
-                </p:cond>
-              </p:prevCondLst>
-              <p:nextCondLst>
-                <p:cond evt="onNext" delay="0">
-                  <p:tgtEl>
-                    <p:sldTgt/>
-                  </p:tgtEl>
-                </p:cond>
-              </p:nextCondLst>
-            </p:seq>
-          </p:childTnLst>
-        </p:cTn>
-      </p:par>
-    </p:tnLst>
-  </p:timing>
 </p:sld>
 </file>
 

</xml_diff>

<commit_message>
FAIR checked for release
</commit_message>
<xml_diff>
--- a/instructors/03_Being_FAIR_Episode_v2.0.pptx
+++ b/instructors/03_Being_FAIR_Episode_v2.0.pptx
@@ -3756,7 +3756,7 @@
                 <a:hlinkClick r:id="rId2">
                   <a:extLst>
                     <a:ext uri="{A12FA001-AC4F-418D-AE19-62706E023703}">
-                      <ahyp:hlinkClr xmlns="" xmlns:ahyp="http://schemas.microsoft.com/office/drawing/2018/hyperlinkcolor" val="tx"/>
+                      <ahyp:hlinkClr xmlns:ahyp="http://schemas.microsoft.com/office/drawing/2018/hyperlinkcolor" xmlns="" val="tx"/>
                     </a:ext>
                   </a:extLst>
                 </a:hlinkClick>
@@ -3779,7 +3779,7 @@
                 <a:hlinkClick r:id="rId3">
                   <a:extLst>
                     <a:ext uri="{A12FA001-AC4F-418D-AE19-62706E023703}">
-                      <ahyp:hlinkClr xmlns="" xmlns:ahyp="http://schemas.microsoft.com/office/drawing/2018/hyperlinkcolor" val="tx"/>
+                      <ahyp:hlinkClr xmlns:ahyp="http://schemas.microsoft.com/office/drawing/2018/hyperlinkcolor" xmlns="" val="tx"/>
                     </a:ext>
                   </a:extLst>
                 </a:hlinkClick>
@@ -3802,7 +3802,7 @@
                 <a:hlinkClick r:id="rId4">
                   <a:extLst>
                     <a:ext uri="{A12FA001-AC4F-418D-AE19-62706E023703}">
-                      <ahyp:hlinkClr xmlns="" xmlns:ahyp="http://schemas.microsoft.com/office/drawing/2018/hyperlinkcolor" val="tx"/>
+                      <ahyp:hlinkClr xmlns:ahyp="http://schemas.microsoft.com/office/drawing/2018/hyperlinkcolor" xmlns="" val="tx"/>
                     </a:ext>
                   </a:extLst>
                 </a:hlinkClick>
@@ -3825,7 +3825,7 @@
                 <a:hlinkClick r:id="rId5">
                   <a:extLst>
                     <a:ext uri="{A12FA001-AC4F-418D-AE19-62706E023703}">
-                      <ahyp:hlinkClr xmlns="" xmlns:ahyp="http://schemas.microsoft.com/office/drawing/2018/hyperlinkcolor" val="tx"/>
+                      <ahyp:hlinkClr xmlns:ahyp="http://schemas.microsoft.com/office/drawing/2018/hyperlinkcolor" xmlns="" val="tx"/>
                     </a:ext>
                   </a:extLst>
                 </a:hlinkClick>
@@ -3867,7 +3867,7 @@
                 <a:hlinkClick r:id="rId6">
                   <a:extLst>
                     <a:ext uri="{A12FA001-AC4F-418D-AE19-62706E023703}">
-                      <ahyp:hlinkClr xmlns="" xmlns:ahyp="http://schemas.microsoft.com/office/drawing/2018/hyperlinkcolor" val="tx"/>
+                      <ahyp:hlinkClr xmlns:ahyp="http://schemas.microsoft.com/office/drawing/2018/hyperlinkcolor" xmlns="" val="tx"/>
                     </a:ext>
                   </a:extLst>
                 </a:hlinkClick>
@@ -3890,7 +3890,7 @@
                 <a:hlinkClick r:id="rId7">
                   <a:extLst>
                     <a:ext uri="{A12FA001-AC4F-418D-AE19-62706E023703}">
-                      <ahyp:hlinkClr xmlns="" xmlns:ahyp="http://schemas.microsoft.com/office/drawing/2018/hyperlinkcolor" val="tx"/>
+                      <ahyp:hlinkClr xmlns:ahyp="http://schemas.microsoft.com/office/drawing/2018/hyperlinkcolor" xmlns="" val="tx"/>
                     </a:ext>
                   </a:extLst>
                 </a:hlinkClick>
@@ -3913,7 +3913,7 @@
                 <a:hlinkClick r:id="rId8">
                   <a:extLst>
                     <a:ext uri="{A12FA001-AC4F-418D-AE19-62706E023703}">
-                      <ahyp:hlinkClr xmlns="" xmlns:ahyp="http://schemas.microsoft.com/office/drawing/2018/hyperlinkcolor" val="tx"/>
+                      <ahyp:hlinkClr xmlns:ahyp="http://schemas.microsoft.com/office/drawing/2018/hyperlinkcolor" xmlns="" val="tx"/>
                     </a:ext>
                   </a:extLst>
                 </a:hlinkClick>
@@ -4600,7 +4600,7 @@
                 <a14:useLocalDpi xmlns:a14="http://schemas.microsoft.com/office/drawing/2010/main" val="0"/>
               </a:ext>
               <a:ext uri="{96DAC541-7B7A-43D3-8B79-37D633B846F1}">
-                <asvg:svgBlip xmlns="" xmlns:asvg="http://schemas.microsoft.com/office/drawing/2016/SVG/main" r:embed="rId3"/>
+                <asvg:svgBlip xmlns:asvg="http://schemas.microsoft.com/office/drawing/2016/SVG/main" xmlns="" r:embed="rId3"/>
               </a:ext>
             </a:extLst>
           </a:blip>
@@ -4812,7 +4812,7 @@
                 <a14:useLocalDpi xmlns:a14="http://schemas.microsoft.com/office/drawing/2010/main" val="0"/>
               </a:ext>
               <a:ext uri="{96DAC541-7B7A-43D3-8B79-37D633B846F1}">
-                <asvg:svgBlip xmlns="" xmlns:asvg="http://schemas.microsoft.com/office/drawing/2016/SVG/main" r:embed="rId7"/>
+                <asvg:svgBlip xmlns:asvg="http://schemas.microsoft.com/office/drawing/2016/SVG/main" xmlns="" r:embed="rId7"/>
               </a:ext>
             </a:extLst>
           </a:blip>
@@ -4883,8 +4883,13 @@
           <a:p>
             <a:r>
               <a:rPr lang="en-GB" dirty="0"/>
-              <a:t>FAIR example</a:t>
-            </a:r>
+              <a:t>FAIR </a:t>
+            </a:r>
+            <a:r>
+              <a:rPr lang="en-GB" dirty="0" smtClean="0"/>
+              <a:t>example exercise</a:t>
+            </a:r>
+            <a:endParaRPr lang="en-GB" dirty="0"/>
           </a:p>
         </p:txBody>
       </p:sp>
@@ -4936,6 +4941,22 @@
             <a:pPr marL="0" indent="0">
               <a:buNone/>
             </a:pPr>
+            <a:r>
+              <a:rPr lang="pl-PL" dirty="0">
+                <a:hlinkClick r:id="rId2"/>
+              </a:rPr>
+              <a:t>https://</a:t>
+            </a:r>
+            <a:r>
+              <a:rPr lang="pl-PL" dirty="0" smtClean="0">
+                <a:hlinkClick r:id="rId2"/>
+              </a:rPr>
+              <a:t>doi.org/10.5281/zenodo.6339631</a:t>
+            </a:r>
+            <a:r>
+              <a:rPr lang="en-GB" dirty="0" smtClean="0"/>
+              <a:t> </a:t>
+            </a:r>
             <a:endParaRPr lang="pl-PL" dirty="0"/>
           </a:p>
           <a:p>
@@ -4954,12 +4975,6 @@
             <a:pPr marL="0" indent="0">
               <a:buNone/>
             </a:pPr>
-            <a:r>
-              <a:rPr lang="en-GB" dirty="0">
-                <a:hlinkClick r:id="rId2"/>
-              </a:rPr>
-              <a:t>https://synbiohub.org/public/bsu/SubtilinReceiver_spaRK_separated/1</a:t>
-            </a:r>
             <a:endParaRPr lang="pl-PL" dirty="0"/>
           </a:p>
           <a:p>
@@ -5451,7 +5466,7 @@
                 <a16:creationId xmlns:a16="http://schemas.microsoft.com/office/drawing/2014/main" id="{91F32EBA-ED97-466E-8CFA-8382584155D0}"/>
               </a:ext>
               <a:ext uri="{C183D7F6-B498-43B3-948B-1728B52AA6E4}">
-                <adec:decorative xmlns="" xmlns:adec="http://schemas.microsoft.com/office/drawing/2017/decorative" val="1"/>
+                <adec:decorative xmlns:adec="http://schemas.microsoft.com/office/drawing/2017/decorative" xmlns="" val="1"/>
               </a:ext>
             </a:extLst>
           </p:cNvPr>
@@ -5584,7 +5599,7 @@
                 <a16:creationId xmlns:a16="http://schemas.microsoft.com/office/drawing/2014/main" id="{62A38935-BB53-4DF7-A56E-48DD25B685D7}"/>
               </a:ext>
               <a:ext uri="{C183D7F6-B498-43B3-948B-1728B52AA6E4}">
-                <adec:decorative xmlns="" xmlns:adec="http://schemas.microsoft.com/office/drawing/2017/decorative" val="1"/>
+                <adec:decorative xmlns:adec="http://schemas.microsoft.com/office/drawing/2017/decorative" xmlns="" val="1"/>
               </a:ext>
             </a:extLst>
           </p:cNvPr>
@@ -6371,7 +6386,7 @@
                 <a14:useLocalDpi xmlns:a14="http://schemas.microsoft.com/office/drawing/2010/main" val="0"/>
               </a:ext>
               <a:ext uri="{96DAC541-7B7A-43D3-8B79-37D633B846F1}">
-                <asvg:svgBlip xmlns="" xmlns:asvg="http://schemas.microsoft.com/office/drawing/2016/SVG/main" r:embed="rId3"/>
+                <asvg:svgBlip xmlns:asvg="http://schemas.microsoft.com/office/drawing/2016/SVG/main" xmlns="" r:embed="rId3"/>
               </a:ext>
             </a:extLst>
           </a:blip>
@@ -6437,7 +6452,7 @@
                 <a16:creationId xmlns:a16="http://schemas.microsoft.com/office/drawing/2014/main" id="{C4E4288A-DFC8-40A2-90E5-70E851A933AD}"/>
               </a:ext>
               <a:ext uri="{C183D7F6-B498-43B3-948B-1728B52AA6E4}">
-                <adec:decorative xmlns="" xmlns:adec="http://schemas.microsoft.com/office/drawing/2017/decorative" val="1"/>
+                <adec:decorative xmlns:adec="http://schemas.microsoft.com/office/drawing/2017/decorative" xmlns="" val="1"/>
               </a:ext>
             </a:extLst>
           </p:cNvPr>
@@ -6532,7 +6547,7 @@
                 <a16:creationId xmlns:a16="http://schemas.microsoft.com/office/drawing/2014/main" id="{A94A2FC9-6D19-473C-B868-99FDB2044AA9}"/>
               </a:ext>
               <a:ext uri="{C183D7F6-B498-43B3-948B-1728B52AA6E4}">
-                <adec:decorative xmlns="" xmlns:adec="http://schemas.microsoft.com/office/drawing/2017/decorative" val="1"/>
+                <adec:decorative xmlns:adec="http://schemas.microsoft.com/office/drawing/2017/decorative" xmlns="" val="1"/>
               </a:ext>
             </a:extLst>
           </p:cNvPr>
@@ -6751,7 +6766,7 @@
                 <a14:useLocalDpi xmlns:a14="http://schemas.microsoft.com/office/drawing/2010/main" val="0"/>
               </a:ext>
               <a:ext uri="{96DAC541-7B7A-43D3-8B79-37D633B846F1}">
-                <asvg:svgBlip xmlns="" xmlns:asvg="http://schemas.microsoft.com/office/drawing/2016/SVG/main" r:embed="rId3"/>
+                <asvg:svgBlip xmlns:asvg="http://schemas.microsoft.com/office/drawing/2016/SVG/main" xmlns="" r:embed="rId3"/>
               </a:ext>
             </a:extLst>
           </a:blip>
@@ -6887,7 +6902,7 @@
                 <a16:creationId xmlns:a16="http://schemas.microsoft.com/office/drawing/2014/main" id="{8BED0409-854E-49C4-876E-A78C6D881BC8}"/>
               </a:ext>
               <a:ext uri="{C183D7F6-B498-43B3-948B-1728B52AA6E4}">
-                <adec:decorative xmlns="" xmlns:adec="http://schemas.microsoft.com/office/drawing/2017/decorative" val="1"/>
+                <adec:decorative xmlns:adec="http://schemas.microsoft.com/office/drawing/2017/decorative" xmlns="" val="1"/>
               </a:ext>
             </a:extLst>
           </p:cNvPr>
@@ -7532,7 +7547,7 @@
                 <a16:creationId xmlns:a16="http://schemas.microsoft.com/office/drawing/2014/main" id="{D4340B2E-01FD-4F5D-9C4D-AD3923AD20BA}"/>
               </a:ext>
               <a:ext uri="{C183D7F6-B498-43B3-948B-1728B52AA6E4}">
-                <adec:decorative xmlns="" xmlns:adec="http://schemas.microsoft.com/office/drawing/2017/decorative" val="1"/>
+                <adec:decorative xmlns:adec="http://schemas.microsoft.com/office/drawing/2017/decorative" xmlns="" val="1"/>
               </a:ext>
             </a:extLst>
           </p:cNvPr>
@@ -7751,7 +7766,7 @@
                 <a14:useLocalDpi xmlns:a14="http://schemas.microsoft.com/office/drawing/2010/main" val="0"/>
               </a:ext>
               <a:ext uri="{96DAC541-7B7A-43D3-8B79-37D633B846F1}">
-                <asvg:svgBlip xmlns="" xmlns:asvg="http://schemas.microsoft.com/office/drawing/2016/SVG/main" r:embed="rId5"/>
+                <asvg:svgBlip xmlns:asvg="http://schemas.microsoft.com/office/drawing/2016/SVG/main" xmlns="" r:embed="rId5"/>
               </a:ext>
             </a:extLst>
           </a:blip>
@@ -7790,7 +7805,7 @@
                 <a14:useLocalDpi xmlns:a14="http://schemas.microsoft.com/office/drawing/2010/main" val="0"/>
               </a:ext>
               <a:ext uri="{96DAC541-7B7A-43D3-8B79-37D633B846F1}">
-                <asvg:svgBlip xmlns="" xmlns:asvg="http://schemas.microsoft.com/office/drawing/2016/SVG/main" r:embed="rId7"/>
+                <asvg:svgBlip xmlns:asvg="http://schemas.microsoft.com/office/drawing/2016/SVG/main" xmlns="" r:embed="rId7"/>
               </a:ext>
             </a:extLst>
           </a:blip>
@@ -8046,8 +8061,12 @@
               <a:t>Impossible </a:t>
             </a:r>
             <a:r>
-              <a:rPr lang="pl-PL" dirty="0" err="1"/>
-              <a:t>average</a:t>
+              <a:rPr lang="pl-PL" dirty="0" smtClean="0"/>
+              <a:t>averag</a:t>
+            </a:r>
+            <a:r>
+              <a:rPr lang="en-GB" dirty="0" smtClean="0"/>
+              <a:t>e</a:t>
             </a:r>
             <a:endParaRPr lang="en-GB" dirty="0"/>
           </a:p>
@@ -8083,55 +8102,103 @@
               <a:t> to </a:t>
             </a:r>
             <a:r>
-              <a:rPr lang="pl-PL" dirty="0" err="1"/>
-              <a:t>find</a:t>
+              <a:rPr lang="pl-PL" dirty="0" smtClean="0"/>
+              <a:t>fin</a:t>
+            </a:r>
+            <a:r>
+              <a:rPr lang="en-GB" dirty="0" smtClean="0"/>
+              <a:t>d</a:t>
+            </a:r>
+            <a:r>
+              <a:rPr lang="pl-PL" dirty="0" smtClean="0"/>
+              <a:t> </a:t>
             </a:r>
             <a:r>
               <a:rPr lang="pl-PL" dirty="0"/>
-              <a:t> the </a:t>
-            </a:r>
-            <a:r>
-              <a:rPr lang="pl-PL" dirty="0" err="1"/>
-              <a:t>right</a:t>
+              <a:t>the </a:t>
+            </a:r>
+            <a:r>
+              <a:rPr lang="pl-PL" dirty="0" smtClean="0"/>
+              <a:t>righ</a:t>
+            </a:r>
+            <a:r>
+              <a:rPr lang="en-GB" dirty="0" smtClean="0"/>
+              <a:t>t</a:t>
+            </a:r>
+            <a:r>
+              <a:rPr lang="pl-PL" dirty="0" smtClean="0"/>
+              <a:t> </a:t>
             </a:r>
             <a:r>
               <a:rPr lang="pl-PL" dirty="0"/>
-              <a:t> data </a:t>
-            </a:r>
-            <a:r>
-              <a:rPr lang="pl-PL" dirty="0" err="1"/>
-              <a:t>table</a:t>
+              <a:t>data </a:t>
+            </a:r>
+            <a:r>
+              <a:rPr lang="pl-PL" dirty="0" smtClean="0"/>
+              <a:t>tabl</a:t>
+            </a:r>
+            <a:r>
+              <a:rPr lang="en-GB" dirty="0" smtClean="0"/>
+              <a:t>e</a:t>
+            </a:r>
+            <a:r>
+              <a:rPr lang="pl-PL" dirty="0" smtClean="0"/>
+              <a:t> </a:t>
             </a:r>
             <a:r>
               <a:rPr lang="pl-PL" dirty="0"/>
-              <a:t> and </a:t>
-            </a:r>
-            <a:r>
-              <a:rPr lang="pl-PL" dirty="0" err="1"/>
-              <a:t>column</a:t>
+              <a:t>and </a:t>
+            </a:r>
+            <a:r>
+              <a:rPr lang="pl-PL" dirty="0" smtClean="0"/>
+              <a:t>colum</a:t>
+            </a:r>
+            <a:r>
+              <a:rPr lang="en-GB" dirty="0" smtClean="0"/>
+              <a:t>n</a:t>
             </a:r>
             <a:endParaRPr lang="pl-PL" dirty="0"/>
           </a:p>
           <a:p>
             <a:r>
-              <a:rPr lang="pl-PL" dirty="0" err="1"/>
-              <a:t>Numerical</a:t>
+              <a:rPr lang="pl-PL" dirty="0" smtClean="0"/>
+              <a:t>Numerica</a:t>
+            </a:r>
+            <a:r>
+              <a:rPr lang="en-GB" dirty="0" smtClean="0"/>
+              <a:t>l</a:t>
+            </a:r>
+            <a:r>
+              <a:rPr lang="pl-PL" dirty="0" smtClean="0"/>
+              <a:t> </a:t>
             </a:r>
             <a:r>
               <a:rPr lang="pl-PL" dirty="0"/>
-              <a:t> data in pdf not </a:t>
-            </a:r>
-            <a:r>
-              <a:rPr lang="pl-PL" dirty="0" err="1"/>
-              <a:t>suitable</a:t>
+              <a:t>data in pdf not </a:t>
+            </a:r>
+            <a:r>
+              <a:rPr lang="pl-PL" dirty="0" smtClean="0"/>
+              <a:t>suitabl</a:t>
+            </a:r>
+            <a:r>
+              <a:rPr lang="en-GB" dirty="0" smtClean="0"/>
+              <a:t>e</a:t>
+            </a:r>
+            <a:r>
+              <a:rPr lang="pl-PL" dirty="0" smtClean="0"/>
+              <a:t> </a:t>
             </a:r>
             <a:r>
               <a:rPr lang="pl-PL" dirty="0"/>
-              <a:t> for </a:t>
-            </a:r>
-            <a:r>
-              <a:rPr lang="pl-PL" dirty="0" err="1"/>
-              <a:t>calculations</a:t>
+              <a:t>for </a:t>
+            </a:r>
+            <a:r>
+              <a:rPr lang="pl-PL" dirty="0" smtClean="0"/>
+              <a:t>calculation</a:t>
+            </a:r>
+            <a:r>
+              <a:rPr lang="en-GB" dirty="0" smtClean="0"/>
+              <a:t>s</a:t>
             </a:r>
             <a:endParaRPr lang="pl-PL" dirty="0"/>
           </a:p>

</xml_diff>